<commit_message>
Edits from Google Docs
</commit_message>
<xml_diff>
--- a/docs/deployment_guide/images/architecture-diagram-salesforce-industries-virtual-calls.pptx
+++ b/docs/deployment_guide/images/architecture-diagram-salesforce-industries-virtual-calls.pptx
@@ -243,7 +243,7 @@
           <a:p>
             <a:fld id="{910FE9F8-85C6-4D94-8C60-6B46B301E45E}" type="datetimeFigureOut">
               <a:rPr lang="en-US" smtClean="0"/>
-              <a:t>12/16/22</a:t>
+              <a:t>1/10/2023</a:t>
             </a:fld>
             <a:endParaRPr lang="en-US"/>
           </a:p>
@@ -413,7 +413,7 @@
           <a:p>
             <a:fld id="{910FE9F8-85C6-4D94-8C60-6B46B301E45E}" type="datetimeFigureOut">
               <a:rPr lang="en-US" smtClean="0"/>
-              <a:t>12/16/22</a:t>
+              <a:t>1/10/2023</a:t>
             </a:fld>
             <a:endParaRPr lang="en-US"/>
           </a:p>
@@ -593,7 +593,7 @@
           <a:p>
             <a:fld id="{910FE9F8-85C6-4D94-8C60-6B46B301E45E}" type="datetimeFigureOut">
               <a:rPr lang="en-US" smtClean="0"/>
-              <a:t>12/16/22</a:t>
+              <a:t>1/10/2023</a:t>
             </a:fld>
             <a:endParaRPr lang="en-US"/>
           </a:p>
@@ -763,7 +763,7 @@
           <a:p>
             <a:fld id="{910FE9F8-85C6-4D94-8C60-6B46B301E45E}" type="datetimeFigureOut">
               <a:rPr lang="en-US" smtClean="0"/>
-              <a:t>12/16/22</a:t>
+              <a:t>1/10/2023</a:t>
             </a:fld>
             <a:endParaRPr lang="en-US"/>
           </a:p>
@@ -1009,7 +1009,7 @@
           <a:p>
             <a:fld id="{910FE9F8-85C6-4D94-8C60-6B46B301E45E}" type="datetimeFigureOut">
               <a:rPr lang="en-US" smtClean="0"/>
-              <a:t>12/16/22</a:t>
+              <a:t>1/10/2023</a:t>
             </a:fld>
             <a:endParaRPr lang="en-US"/>
           </a:p>
@@ -1241,7 +1241,7 @@
           <a:p>
             <a:fld id="{910FE9F8-85C6-4D94-8C60-6B46B301E45E}" type="datetimeFigureOut">
               <a:rPr lang="en-US" smtClean="0"/>
-              <a:t>12/16/22</a:t>
+              <a:t>1/10/2023</a:t>
             </a:fld>
             <a:endParaRPr lang="en-US"/>
           </a:p>
@@ -1608,7 +1608,7 @@
           <a:p>
             <a:fld id="{910FE9F8-85C6-4D94-8C60-6B46B301E45E}" type="datetimeFigureOut">
               <a:rPr lang="en-US" smtClean="0"/>
-              <a:t>12/16/22</a:t>
+              <a:t>1/10/2023</a:t>
             </a:fld>
             <a:endParaRPr lang="en-US"/>
           </a:p>
@@ -1726,7 +1726,7 @@
           <a:p>
             <a:fld id="{910FE9F8-85C6-4D94-8C60-6B46B301E45E}" type="datetimeFigureOut">
               <a:rPr lang="en-US" smtClean="0"/>
-              <a:t>12/16/22</a:t>
+              <a:t>1/10/2023</a:t>
             </a:fld>
             <a:endParaRPr lang="en-US"/>
           </a:p>
@@ -1821,7 +1821,7 @@
           <a:p>
             <a:fld id="{910FE9F8-85C6-4D94-8C60-6B46B301E45E}" type="datetimeFigureOut">
               <a:rPr lang="en-US" smtClean="0"/>
-              <a:t>12/16/22</a:t>
+              <a:t>1/10/2023</a:t>
             </a:fld>
             <a:endParaRPr lang="en-US"/>
           </a:p>
@@ -2098,7 +2098,7 @@
           <a:p>
             <a:fld id="{910FE9F8-85C6-4D94-8C60-6B46B301E45E}" type="datetimeFigureOut">
               <a:rPr lang="en-US" smtClean="0"/>
-              <a:t>12/16/22</a:t>
+              <a:t>1/10/2023</a:t>
             </a:fld>
             <a:endParaRPr lang="en-US"/>
           </a:p>
@@ -2355,7 +2355,7 @@
           <a:p>
             <a:fld id="{910FE9F8-85C6-4D94-8C60-6B46B301E45E}" type="datetimeFigureOut">
               <a:rPr lang="en-US" smtClean="0"/>
-              <a:t>12/16/22</a:t>
+              <a:t>1/10/2023</a:t>
             </a:fld>
             <a:endParaRPr lang="en-US"/>
           </a:p>
@@ -2568,7 +2568,7 @@
           <a:p>
             <a:fld id="{910FE9F8-85C6-4D94-8C60-6B46B301E45E}" type="datetimeFigureOut">
               <a:rPr lang="en-US" smtClean="0"/>
-              <a:t>12/16/22</a:t>
+              <a:t>1/10/2023</a:t>
             </a:fld>
             <a:endParaRPr lang="en-US"/>
           </a:p>

</xml_diff>